<commit_message>
Hatalı yükleme bulunmuş, tekrar yüklendi.
</commit_message>
<xml_diff>
--- a/Project_presentation/Project_presentation.pptx
+++ b/Project_presentation/Project_presentation.pptx
@@ -25317,48 +25317,6 @@
           <a:chExt cx="0" cy="0"/>
         </a:xfrm>
       </p:grpSpPr>
-      <p:sp>
-        <p:nvSpPr>
-          <p:cNvPr id="868" name="Google Shape;868;p56"/>
-          <p:cNvSpPr txBox="1">
-            <a:spLocks noGrp="1"/>
-          </p:cNvSpPr>
-          <p:nvPr>
-            <p:ph type="title"/>
-          </p:nvPr>
-        </p:nvSpPr>
-        <p:spPr>
-          <a:xfrm>
-            <a:off x="1331640" y="-236562"/>
-            <a:ext cx="6696744" cy="1512168"/>
-          </a:xfrm>
-          <a:prstGeom prst="rect">
-            <a:avLst/>
-          </a:prstGeom>
-        </p:spPr>
-        <p:txBody>
-          <a:bodyPr spcFirstLastPara="1" wrap="square" lIns="91425" tIns="91425" rIns="91425" bIns="91425" anchor="ctr" anchorCtr="0">
-            <a:noAutofit/>
-          </a:bodyPr>
-          <a:lstStyle/>
-          <a:p>
-            <a:pPr marL="0" lvl="0" indent="0" algn="ctr" rtl="0">
-              <a:spcBef>
-                <a:spcPts val="0"/>
-              </a:spcBef>
-              <a:spcAft>
-                <a:spcPts val="0"/>
-              </a:spcAft>
-              <a:buNone/>
-            </a:pPr>
-            <a:r>
-              <a:rPr lang="tr-TR" sz="6600" dirty="0" smtClean="0"/>
-              <a:t>TESEKKURLER!</a:t>
-            </a:r>
-            <a:endParaRPr sz="6600" dirty="0"/>
-          </a:p>
-        </p:txBody>
-      </p:sp>
       <p:grpSp>
         <p:nvGrpSpPr>
           <p:cNvPr id="869" name="Google Shape;869;p56"/>
@@ -26333,7 +26291,7 @@
       </p:grpSp>
       <p:pic>
         <p:nvPicPr>
-          <p:cNvPr id="8194" name="Picture 2" descr="C:\Users\Cemal\Desktop\sunum görsel\havelsan.jpg"/>
+          <p:cNvPr id="1026" name="Picture 2" descr="C:\Users\Cemal\Desktop\sunum görsel\1623308921059.jfif"/>
           <p:cNvPicPr>
             <a:picLocks noChangeAspect="1" noChangeArrowheads="1"/>
           </p:cNvPicPr>
@@ -26354,8 +26312,8 @@
         </p:blipFill>
         <p:spPr bwMode="auto">
           <a:xfrm>
-            <a:off x="1043608" y="987574"/>
-            <a:ext cx="7344816" cy="3904915"/>
+            <a:off x="1" y="9858"/>
+            <a:ext cx="9144000" cy="5133642"/>
           </a:xfrm>
           <a:prstGeom prst="rect">
             <a:avLst/>
@@ -26740,21 +26698,8 @@
             </a:pPr>
             <a:r>
               <a:rPr lang="tr-TR" dirty="0" smtClean="0"/>
-              <a:t>Kullanıcılar, site içinde il, </a:t>
+              <a:t>Kullanıcılar, site içinde il, ilçe ve mahalle bazlı filtrelemeler yaparak diledikleri siteyi arayabilirler.</a:t>
             </a:r>
-            <a:r>
-              <a:rPr lang="tr-TR" dirty="0" smtClean="0"/>
-              <a:t>ilçe </a:t>
-            </a:r>
-            <a:r>
-              <a:rPr lang="tr-TR" dirty="0" smtClean="0"/>
-              <a:t>ve mahalle bazlı filtrelemeler yaparak diledikleri siteyi </a:t>
-            </a:r>
-            <a:r>
-              <a:rPr lang="tr-TR" dirty="0" smtClean="0"/>
-              <a:t>arayabilirler.</a:t>
-            </a:r>
-            <a:endParaRPr lang="tr-TR" dirty="0" smtClean="0"/>
           </a:p>
           <a:p>
             <a:pPr marL="171450" lvl="0" indent="-171450">

</xml_diff>